<commit_message>
diagram fixes for ch 6
</commit_message>
<xml_diff>
--- a/images/inference/src/power-diagram.pptx
+++ b/images/inference/src/power-diagram.pptx
@@ -694,7 +694,7 @@
           <a:p>
             <a:fld id="{5303E370-D265-2C46-8068-DCA558B4929C}" type="datetimeFigureOut">
               <a:rPr lang="en-US" smtClean="0"/>
-              <a:t>10/8/23</a:t>
+              <a:t>12/19/23</a:t>
             </a:fld>
             <a:endParaRPr lang="en-US"/>
           </a:p>
@@ -892,7 +892,7 @@
           <a:p>
             <a:fld id="{5303E370-D265-2C46-8068-DCA558B4929C}" type="datetimeFigureOut">
               <a:rPr lang="en-US" smtClean="0"/>
-              <a:t>10/8/23</a:t>
+              <a:t>12/19/23</a:t>
             </a:fld>
             <a:endParaRPr lang="en-US"/>
           </a:p>
@@ -1100,7 +1100,7 @@
           <a:p>
             <a:fld id="{5303E370-D265-2C46-8068-DCA558B4929C}" type="datetimeFigureOut">
               <a:rPr lang="en-US" smtClean="0"/>
-              <a:t>10/8/23</a:t>
+              <a:t>12/19/23</a:t>
             </a:fld>
             <a:endParaRPr lang="en-US"/>
           </a:p>
@@ -1298,7 +1298,7 @@
           <a:p>
             <a:fld id="{5303E370-D265-2C46-8068-DCA558B4929C}" type="datetimeFigureOut">
               <a:rPr lang="en-US" smtClean="0"/>
-              <a:t>10/8/23</a:t>
+              <a:t>12/19/23</a:t>
             </a:fld>
             <a:endParaRPr lang="en-US"/>
           </a:p>
@@ -1573,7 +1573,7 @@
           <a:p>
             <a:fld id="{5303E370-D265-2C46-8068-DCA558B4929C}" type="datetimeFigureOut">
               <a:rPr lang="en-US" smtClean="0"/>
-              <a:t>10/8/23</a:t>
+              <a:t>12/19/23</a:t>
             </a:fld>
             <a:endParaRPr lang="en-US"/>
           </a:p>
@@ -1838,7 +1838,7 @@
           <a:p>
             <a:fld id="{5303E370-D265-2C46-8068-DCA558B4929C}" type="datetimeFigureOut">
               <a:rPr lang="en-US" smtClean="0"/>
-              <a:t>10/8/23</a:t>
+              <a:t>12/19/23</a:t>
             </a:fld>
             <a:endParaRPr lang="en-US"/>
           </a:p>
@@ -2250,7 +2250,7 @@
           <a:p>
             <a:fld id="{5303E370-D265-2C46-8068-DCA558B4929C}" type="datetimeFigureOut">
               <a:rPr lang="en-US" smtClean="0"/>
-              <a:t>10/8/23</a:t>
+              <a:t>12/19/23</a:t>
             </a:fld>
             <a:endParaRPr lang="en-US"/>
           </a:p>
@@ -2391,7 +2391,7 @@
           <a:p>
             <a:fld id="{5303E370-D265-2C46-8068-DCA558B4929C}" type="datetimeFigureOut">
               <a:rPr lang="en-US" smtClean="0"/>
-              <a:t>10/8/23</a:t>
+              <a:t>12/19/23</a:t>
             </a:fld>
             <a:endParaRPr lang="en-US"/>
           </a:p>
@@ -2504,7 +2504,7 @@
           <a:p>
             <a:fld id="{5303E370-D265-2C46-8068-DCA558B4929C}" type="datetimeFigureOut">
               <a:rPr lang="en-US" smtClean="0"/>
-              <a:t>10/8/23</a:t>
+              <a:t>12/19/23</a:t>
             </a:fld>
             <a:endParaRPr lang="en-US"/>
           </a:p>
@@ -2815,7 +2815,7 @@
           <a:p>
             <a:fld id="{5303E370-D265-2C46-8068-DCA558B4929C}" type="datetimeFigureOut">
               <a:rPr lang="en-US" smtClean="0"/>
-              <a:t>10/8/23</a:t>
+              <a:t>12/19/23</a:t>
             </a:fld>
             <a:endParaRPr lang="en-US"/>
           </a:p>
@@ -3103,7 +3103,7 @@
           <a:p>
             <a:fld id="{5303E370-D265-2C46-8068-DCA558B4929C}" type="datetimeFigureOut">
               <a:rPr lang="en-US" smtClean="0"/>
-              <a:t>10/8/23</a:t>
+              <a:t>12/19/23</a:t>
             </a:fld>
             <a:endParaRPr lang="en-US"/>
           </a:p>
@@ -3344,7 +3344,7 @@
           <a:p>
             <a:fld id="{5303E370-D265-2C46-8068-DCA558B4929C}" type="datetimeFigureOut">
               <a:rPr lang="en-US" smtClean="0"/>
-              <a:t>10/8/23</a:t>
+              <a:t>12/19/23</a:t>
             </a:fld>
             <a:endParaRPr lang="en-US"/>
           </a:p>
@@ -4031,7 +4031,7 @@
         <p:spPr>
           <a:xfrm>
             <a:off x="4251680" y="1586306"/>
-            <a:ext cx="1584857" cy="369332"/>
+            <a:ext cx="1617751" cy="369332"/>
           </a:xfrm>
           <a:prstGeom prst="rect">
             <a:avLst/>
@@ -4045,15 +4045,24 @@
           <a:lstStyle/>
           <a:p>
             <a:r>
-              <a:rPr lang="en-US" dirty="0"/>
+              <a:rPr lang="en-US" dirty="0">
+                <a:latin typeface="Source Sans Pro" panose="020B0503030403020204" pitchFamily="34" charset="0"/>
+                <a:ea typeface="Source Sans Pro" panose="020B0503030403020204" pitchFamily="34" charset="0"/>
+              </a:rPr>
               <a:t>Reject null (H</a:t>
             </a:r>
             <a:r>
-              <a:rPr lang="en-US" baseline="-25000" dirty="0"/>
+              <a:rPr lang="en-US" baseline="-25000" dirty="0">
+                <a:latin typeface="Source Sans Pro" panose="020B0503030403020204" pitchFamily="34" charset="0"/>
+                <a:ea typeface="Source Sans Pro" panose="020B0503030403020204" pitchFamily="34" charset="0"/>
+              </a:rPr>
               <a:t>0</a:t>
             </a:r>
             <a:r>
-              <a:rPr lang="en-US" dirty="0"/>
+              <a:rPr lang="en-US" dirty="0">
+                <a:latin typeface="Source Sans Pro" panose="020B0503030403020204" pitchFamily="34" charset="0"/>
+                <a:ea typeface="Source Sans Pro" panose="020B0503030403020204" pitchFamily="34" charset="0"/>
+              </a:rPr>
               <a:t>)</a:t>
             </a:r>
           </a:p>
@@ -4074,7 +4083,7 @@
         <p:spPr>
           <a:xfrm>
             <a:off x="6300595" y="1586306"/>
-            <a:ext cx="2159309" cy="369332"/>
+            <a:ext cx="2209259" cy="369332"/>
           </a:xfrm>
           <a:prstGeom prst="rect">
             <a:avLst/>
@@ -4088,22 +4097,31 @@
           <a:lstStyle/>
           <a:p>
             <a:r>
-              <a:rPr lang="en-US" dirty="0"/>
+              <a:rPr lang="en-US" dirty="0">
+                <a:latin typeface="Source Sans Pro" panose="020B0503030403020204" pitchFamily="34" charset="0"/>
+                <a:ea typeface="Source Sans Pro" panose="020B0503030403020204" pitchFamily="34" charset="0"/>
+              </a:rPr>
               <a:t>Fail to reject null (H</a:t>
             </a:r>
             <a:r>
-              <a:rPr lang="en-US" baseline="-25000" dirty="0"/>
+              <a:rPr lang="en-US" baseline="-25000" dirty="0">
+                <a:latin typeface="Source Sans Pro" panose="020B0503030403020204" pitchFamily="34" charset="0"/>
+                <a:ea typeface="Source Sans Pro" panose="020B0503030403020204" pitchFamily="34" charset="0"/>
+              </a:rPr>
               <a:t>0</a:t>
             </a:r>
             <a:r>
-              <a:rPr lang="en-US" dirty="0"/>
+              <a:rPr lang="en-US" dirty="0">
+                <a:latin typeface="Source Sans Pro" panose="020B0503030403020204" pitchFamily="34" charset="0"/>
+                <a:ea typeface="Source Sans Pro" panose="020B0503030403020204" pitchFamily="34" charset="0"/>
+              </a:rPr>
               <a:t>)</a:t>
             </a:r>
           </a:p>
         </p:txBody>
       </p:sp>
-      <mc:AlternateContent xmlns:mc="http://schemas.openxmlformats.org/markup-compatibility/2006" xmlns:a14="http://schemas.microsoft.com/office/drawing/2010/main">
-        <mc:Choice Requires="a14">
+      <mc:AlternateContent xmlns:mc="http://schemas.openxmlformats.org/markup-compatibility/2006">
+        <mc:Choice xmlns:a14="http://schemas.microsoft.com/office/drawing/2010/main" Requires="a14">
           <p:sp>
             <p:nvSpPr>
               <p:cNvPr id="15" name="TextBox 14">
@@ -4119,7 +4137,7 @@
             <p:spPr>
               <a:xfrm>
                 <a:off x="6649630" y="3372793"/>
-                <a:ext cx="1503489" cy="923330"/>
+                <a:ext cx="1561646" cy="923330"/>
               </a:xfrm>
               <a:prstGeom prst="rect">
                 <a:avLst/>
@@ -4133,7 +4151,10 @@
               <a:lstStyle/>
               <a:p>
                 <a:r>
-                  <a:rPr lang="en-US" dirty="0"/>
+                  <a:rPr lang="en-US" dirty="0">
+                    <a:latin typeface="Source Sans Pro" panose="020B0503030403020204" pitchFamily="34" charset="0"/>
+                    <a:ea typeface="Source Sans Pro" panose="020B0503030403020204" pitchFamily="34" charset="0"/>
+                  </a:rPr>
                   <a:t>False negative</a:t>
                 </a:r>
               </a:p>
@@ -4155,15 +4176,21 @@
                     </m:oMath>
                   </m:oMathPara>
                 </a14:m>
-                <a:endParaRPr lang="en-US" dirty="0"/>
+                <a:endParaRPr lang="en-US" dirty="0">
+                  <a:latin typeface="Source Sans Pro" panose="020B0503030403020204" pitchFamily="34" charset="0"/>
+                  <a:ea typeface="Source Sans Pro" panose="020B0503030403020204" pitchFamily="34" charset="0"/>
+                </a:endParaRPr>
               </a:p>
               <a:p>
-                <a:endParaRPr lang="en-US" dirty="0"/>
+                <a:endParaRPr lang="en-US" dirty="0">
+                  <a:latin typeface="Source Sans Pro" panose="020B0503030403020204" pitchFamily="34" charset="0"/>
+                  <a:ea typeface="Source Sans Pro" panose="020B0503030403020204" pitchFamily="34" charset="0"/>
+                </a:endParaRPr>
               </a:p>
             </p:txBody>
           </p:sp>
         </mc:Choice>
-        <mc:Fallback xmlns="">
+        <mc:Fallback>
           <p:sp>
             <p:nvSpPr>
               <p:cNvPr id="15" name="TextBox 14">
@@ -4181,7 +4208,7 @@
             <p:spPr>
               <a:xfrm>
                 <a:off x="6649630" y="3372793"/>
-                <a:ext cx="1503489" cy="923330"/>
+                <a:ext cx="1561646" cy="923330"/>
               </a:xfrm>
               <a:prstGeom prst="rect">
                 <a:avLst/>
@@ -4189,7 +4216,7 @@
               <a:blipFill>
                 <a:blip r:embed="rId12"/>
                 <a:stretch>
-                  <a:fillRect l="-3361" t="-2703" r="-2521"/>
+                  <a:fillRect l="-3226" t="-2703" r="-2419"/>
                 </a:stretch>
               </a:blipFill>
             </p:spPr>
@@ -4208,8 +4235,8 @@
           </p:sp>
         </mc:Fallback>
       </mc:AlternateContent>
-      <mc:AlternateContent xmlns:mc="http://schemas.openxmlformats.org/markup-compatibility/2006" xmlns:a14="http://schemas.microsoft.com/office/drawing/2010/main">
-        <mc:Choice Requires="a14">
+      <mc:AlternateContent xmlns:mc="http://schemas.openxmlformats.org/markup-compatibility/2006">
+        <mc:Choice xmlns:a14="http://schemas.microsoft.com/office/drawing/2010/main" Requires="a14">
           <p:sp>
             <p:nvSpPr>
               <p:cNvPr id="16" name="TextBox 15">
@@ -4224,8 +4251,8 @@
             </p:nvSpPr>
             <p:spPr>
               <a:xfrm>
-                <a:off x="4312402" y="2348752"/>
-                <a:ext cx="1439368" cy="646331"/>
+                <a:off x="4285728" y="2348752"/>
+                <a:ext cx="1492716" cy="646331"/>
               </a:xfrm>
               <a:prstGeom prst="rect">
                 <a:avLst/>
@@ -4240,7 +4267,10 @@
               <a:p>
                 <a:pPr algn="ctr"/>
                 <a:r>
-                  <a:rPr lang="en-US" dirty="0"/>
+                  <a:rPr lang="en-US" dirty="0">
+                    <a:latin typeface="Source Sans Pro" panose="020B0503030403020204" pitchFamily="34" charset="0"/>
+                    <a:ea typeface="Source Sans Pro" panose="020B0503030403020204" pitchFamily="34" charset="0"/>
+                  </a:rPr>
                   <a:t>False positive</a:t>
                 </a:r>
               </a:p>
@@ -4262,12 +4292,15 @@
                     </m:oMath>
                   </m:oMathPara>
                 </a14:m>
-                <a:endParaRPr lang="en-US" dirty="0"/>
+                <a:endParaRPr lang="en-US" dirty="0">
+                  <a:latin typeface="Source Sans Pro" panose="020B0503030403020204" pitchFamily="34" charset="0"/>
+                  <a:ea typeface="Source Sans Pro" panose="020B0503030403020204" pitchFamily="34" charset="0"/>
+                </a:endParaRPr>
               </a:p>
             </p:txBody>
           </p:sp>
         </mc:Choice>
-        <mc:Fallback xmlns="">
+        <mc:Fallback>
           <p:sp>
             <p:nvSpPr>
               <p:cNvPr id="16" name="TextBox 15">
@@ -4284,8 +4317,8 @@
             </p:nvSpPr>
             <p:spPr>
               <a:xfrm>
-                <a:off x="4312402" y="2348752"/>
-                <a:ext cx="1439368" cy="646331"/>
+                <a:off x="4285728" y="2348752"/>
+                <a:ext cx="1492716" cy="646331"/>
               </a:xfrm>
               <a:prstGeom prst="rect">
                 <a:avLst/>
@@ -4293,7 +4326,7 @@
               <a:blipFill>
                 <a:blip r:embed="rId13"/>
                 <a:stretch>
-                  <a:fillRect l="-2609" t="-3846" r="-2609"/>
+                  <a:fillRect l="-2521" t="-3846" r="-2521"/>
                 </a:stretch>
               </a:blipFill>
             </p:spPr>
@@ -4327,7 +4360,7 @@
         <p:spPr>
           <a:xfrm>
             <a:off x="5505865" y="1032481"/>
-            <a:ext cx="1387624" cy="461665"/>
+            <a:ext cx="1476686" cy="461665"/>
           </a:xfrm>
           <a:prstGeom prst="rect">
             <a:avLst/>
@@ -4341,7 +4374,10 @@
           <a:lstStyle/>
           <a:p>
             <a:r>
-              <a:rPr lang="en-US" sz="2400" b="1" dirty="0"/>
+              <a:rPr lang="en-US" sz="2400" b="1" dirty="0">
+                <a:latin typeface="Source Sans Pro" panose="020B0503030403020204" pitchFamily="34" charset="0"/>
+                <a:ea typeface="Source Sans Pro" panose="020B0503030403020204" pitchFamily="34" charset="0"/>
+              </a:rPr>
               <a:t>Inference</a:t>
             </a:r>
           </a:p>
@@ -4361,8 +4397,8 @@
         </p:nvSpPr>
         <p:spPr>
           <a:xfrm rot="16200000">
-            <a:off x="2047218" y="2935318"/>
-            <a:ext cx="1065035" cy="461665"/>
+            <a:off x="2006502" y="2935318"/>
+            <a:ext cx="1146468" cy="461665"/>
           </a:xfrm>
           <a:prstGeom prst="rect">
             <a:avLst/>
@@ -4376,7 +4412,10 @@
           <a:lstStyle/>
           <a:p>
             <a:r>
-              <a:rPr lang="en-US" sz="2400" b="1" dirty="0"/>
+              <a:rPr lang="en-US" sz="2400" b="1" dirty="0">
+                <a:latin typeface="Source Sans Pro" panose="020B0503030403020204" pitchFamily="34" charset="0"/>
+                <a:ea typeface="Source Sans Pro" panose="020B0503030403020204" pitchFamily="34" charset="0"/>
+              </a:rPr>
               <a:t>Reality</a:t>
             </a:r>
           </a:p>
@@ -4412,22 +4451,34 @@
           <a:p>
             <a:pPr algn="r"/>
             <a:r>
-              <a:rPr lang="en-US" dirty="0"/>
+              <a:rPr lang="en-US" dirty="0">
+                <a:latin typeface="Source Sans Pro" panose="020B0503030403020204" pitchFamily="34" charset="0"/>
+                <a:ea typeface="Source Sans Pro" panose="020B0503030403020204" pitchFamily="34" charset="0"/>
+              </a:rPr>
               <a:t>Null (H</a:t>
             </a:r>
             <a:r>
-              <a:rPr lang="en-US" baseline="-25000" dirty="0"/>
+              <a:rPr lang="en-US" baseline="-25000" dirty="0">
+                <a:latin typeface="Source Sans Pro" panose="020B0503030403020204" pitchFamily="34" charset="0"/>
+                <a:ea typeface="Source Sans Pro" panose="020B0503030403020204" pitchFamily="34" charset="0"/>
+              </a:rPr>
               <a:t>0</a:t>
             </a:r>
             <a:r>
-              <a:rPr lang="en-US" dirty="0"/>
+              <a:rPr lang="en-US" dirty="0">
+                <a:latin typeface="Source Sans Pro" panose="020B0503030403020204" pitchFamily="34" charset="0"/>
+                <a:ea typeface="Source Sans Pro" panose="020B0503030403020204" pitchFamily="34" charset="0"/>
+              </a:rPr>
               <a:t>)</a:t>
             </a:r>
           </a:p>
           <a:p>
             <a:pPr algn="r"/>
             <a:r>
-              <a:rPr lang="en-US" dirty="0"/>
+              <a:rPr lang="en-US" dirty="0">
+                <a:latin typeface="Source Sans Pro" panose="020B0503030403020204" pitchFamily="34" charset="0"/>
+                <a:ea typeface="Source Sans Pro" panose="020B0503030403020204" pitchFamily="34" charset="0"/>
+              </a:rPr>
               <a:t> is true</a:t>
             </a:r>
           </a:p>
@@ -4463,22 +4514,31 @@
           <a:p>
             <a:pPr algn="r"/>
             <a:r>
-              <a:rPr lang="en-US" dirty="0"/>
+              <a:rPr lang="en-US" dirty="0">
+                <a:latin typeface="Source Sans Pro" panose="020B0503030403020204" pitchFamily="34" charset="0"/>
+                <a:ea typeface="Source Sans Pro" panose="020B0503030403020204" pitchFamily="34" charset="0"/>
+              </a:rPr>
               <a:t>Null (H</a:t>
             </a:r>
             <a:r>
-              <a:rPr lang="en-US" baseline="-25000" dirty="0"/>
+              <a:rPr lang="en-US" baseline="-25000" dirty="0">
+                <a:latin typeface="Source Sans Pro" panose="020B0503030403020204" pitchFamily="34" charset="0"/>
+                <a:ea typeface="Source Sans Pro" panose="020B0503030403020204" pitchFamily="34" charset="0"/>
+              </a:rPr>
               <a:t>0</a:t>
             </a:r>
             <a:r>
-              <a:rPr lang="en-US" dirty="0"/>
+              <a:rPr lang="en-US" dirty="0">
+                <a:latin typeface="Source Sans Pro" panose="020B0503030403020204" pitchFamily="34" charset="0"/>
+                <a:ea typeface="Source Sans Pro" panose="020B0503030403020204" pitchFamily="34" charset="0"/>
+              </a:rPr>
               <a:t>) is false</a:t>
             </a:r>
           </a:p>
         </p:txBody>
       </p:sp>
-      <mc:AlternateContent xmlns:mc="http://schemas.openxmlformats.org/markup-compatibility/2006" xmlns:a14="http://schemas.microsoft.com/office/drawing/2010/main">
-        <mc:Choice Requires="a14">
+      <mc:AlternateContent xmlns:mc="http://schemas.openxmlformats.org/markup-compatibility/2006">
+        <mc:Choice xmlns:a14="http://schemas.microsoft.com/office/drawing/2010/main" Requires="a14">
           <p:sp>
             <p:nvSpPr>
               <p:cNvPr id="22" name="TextBox 21">
@@ -4494,7 +4554,7 @@
             <p:spPr>
               <a:xfrm>
                 <a:off x="4403395" y="3372793"/>
-                <a:ext cx="1439305" cy="923330"/>
+                <a:ext cx="1481496" cy="923330"/>
               </a:xfrm>
               <a:prstGeom prst="rect">
                 <a:avLst/>
@@ -4508,7 +4568,10 @@
               <a:lstStyle/>
               <a:p>
                 <a:r>
-                  <a:rPr lang="en-US" dirty="0"/>
+                  <a:rPr lang="en-US" dirty="0">
+                    <a:latin typeface="Source Sans Pro" panose="020B0503030403020204" pitchFamily="34" charset="0"/>
+                    <a:ea typeface="Source Sans Pro" panose="020B0503030403020204" pitchFamily="34" charset="0"/>
+                  </a:rPr>
                   <a:t>True positive </a:t>
                 </a:r>
               </a:p>
@@ -4537,15 +4600,21 @@
                     </m:oMath>
                   </m:oMathPara>
                 </a14:m>
-                <a:endParaRPr lang="en-US" dirty="0"/>
+                <a:endParaRPr lang="en-US" dirty="0">
+                  <a:latin typeface="Source Sans Pro" panose="020B0503030403020204" pitchFamily="34" charset="0"/>
+                  <a:ea typeface="Source Sans Pro" panose="020B0503030403020204" pitchFamily="34" charset="0"/>
+                </a:endParaRPr>
               </a:p>
               <a:p>
-                <a:endParaRPr lang="en-US" dirty="0"/>
+                <a:endParaRPr lang="en-US" dirty="0">
+                  <a:latin typeface="Source Sans Pro" panose="020B0503030403020204" pitchFamily="34" charset="0"/>
+                  <a:ea typeface="Source Sans Pro" panose="020B0503030403020204" pitchFamily="34" charset="0"/>
+                </a:endParaRPr>
               </a:p>
             </p:txBody>
           </p:sp>
         </mc:Choice>
-        <mc:Fallback xmlns="">
+        <mc:Fallback>
           <p:sp>
             <p:nvSpPr>
               <p:cNvPr id="22" name="TextBox 21">
@@ -4563,7 +4632,7 @@
             <p:spPr>
               <a:xfrm>
                 <a:off x="4403395" y="3372793"/>
-                <a:ext cx="1439305" cy="923330"/>
+                <a:ext cx="1481496" cy="923330"/>
               </a:xfrm>
               <a:prstGeom prst="rect">
                 <a:avLst/>
@@ -4571,7 +4640,7 @@
               <a:blipFill>
                 <a:blip r:embed="rId14"/>
                 <a:stretch>
-                  <a:fillRect l="-3509" t="-2703" r="-3509"/>
+                  <a:fillRect l="-3390" t="-2703" r="-2542"/>
                 </a:stretch>
               </a:blipFill>
             </p:spPr>
@@ -4590,8 +4659,8 @@
           </p:sp>
         </mc:Fallback>
       </mc:AlternateContent>
-      <mc:AlternateContent xmlns:mc="http://schemas.openxmlformats.org/markup-compatibility/2006" xmlns:a14="http://schemas.microsoft.com/office/drawing/2010/main">
-        <mc:Choice Requires="a14">
+      <mc:AlternateContent xmlns:mc="http://schemas.openxmlformats.org/markup-compatibility/2006">
+        <mc:Choice xmlns:a14="http://schemas.microsoft.com/office/drawing/2010/main" Requires="a14">
           <p:sp>
             <p:nvSpPr>
               <p:cNvPr id="23" name="TextBox 22">
@@ -4607,7 +4676,7 @@
             <p:spPr>
               <a:xfrm>
                 <a:off x="6389110" y="2301073"/>
-                <a:ext cx="1764009" cy="646331"/>
+                <a:ext cx="1803699" cy="646331"/>
               </a:xfrm>
               <a:prstGeom prst="rect">
                 <a:avLst/>
@@ -4621,7 +4690,10 @@
               <a:lstStyle/>
               <a:p>
                 <a:r>
-                  <a:rPr lang="en-US" dirty="0"/>
+                  <a:rPr lang="en-US" dirty="0">
+                    <a:latin typeface="Source Sans Pro" panose="020B0503030403020204" pitchFamily="34" charset="0"/>
+                    <a:ea typeface="Source Sans Pro" panose="020B0503030403020204" pitchFamily="34" charset="0"/>
+                  </a:rPr>
                   <a:t>Correct rejection</a:t>
                 </a:r>
               </a:p>
@@ -4650,12 +4722,15 @@
                     </m:oMath>
                   </m:oMathPara>
                 </a14:m>
-                <a:endParaRPr lang="en-US" dirty="0"/>
+                <a:endParaRPr lang="en-US" dirty="0">
+                  <a:latin typeface="Source Sans Pro" panose="020B0503030403020204" pitchFamily="34" charset="0"/>
+                  <a:ea typeface="Source Sans Pro" panose="020B0503030403020204" pitchFamily="34" charset="0"/>
+                </a:endParaRPr>
               </a:p>
             </p:txBody>
           </p:sp>
         </mc:Choice>
-        <mc:Fallback xmlns="">
+        <mc:Fallback>
           <p:sp>
             <p:nvSpPr>
               <p:cNvPr id="23" name="TextBox 22">
@@ -4673,7 +4748,7 @@
             <p:spPr>
               <a:xfrm>
                 <a:off x="6389110" y="2301073"/>
-                <a:ext cx="1764009" cy="646331"/>
+                <a:ext cx="1803699" cy="646331"/>
               </a:xfrm>
               <a:prstGeom prst="rect">
                 <a:avLst/>
@@ -4681,7 +4756,7 @@
               <a:blipFill>
                 <a:blip r:embed="rId15"/>
                 <a:stretch>
-                  <a:fillRect l="-2878" t="-1923" r="-2158"/>
+                  <a:fillRect l="-2797" t="-1923" r="-1399"/>
                 </a:stretch>
               </a:blipFill>
             </p:spPr>
@@ -4714,7 +4789,7 @@
 </file>
 
 <file path=ppt/slides/slide2.xml><?xml version="1.0" encoding="utf-8"?>
-<p:sld xmlns:a="http://schemas.openxmlformats.org/drawingml/2006/main" xmlns:r="http://schemas.openxmlformats.org/officeDocument/2006/relationships" xmlns:p="http://schemas.openxmlformats.org/presentationml/2006/main">
+<p:sld xmlns:a="http://schemas.openxmlformats.org/drawingml/2006/main" xmlns:r="http://schemas.openxmlformats.org/officeDocument/2006/relationships" xmlns:p="http://schemas.openxmlformats.org/presentationml/2006/main" show="0">
   <p:cSld>
     <p:spTree>
       <p:nvGrpSpPr>
@@ -6086,8 +6161,8 @@
         </p:nvSpPr>
         <p:spPr>
           <a:xfrm>
-            <a:off x="5902137" y="2781090"/>
-            <a:ext cx="1273875" cy="369332"/>
+            <a:off x="5851226" y="2781090"/>
+            <a:ext cx="1375698" cy="369332"/>
           </a:xfrm>
           <a:prstGeom prst="rect">
             <a:avLst/>
@@ -6102,7 +6177,10 @@
           <a:p>
             <a:pPr algn="ctr"/>
             <a:r>
-              <a:rPr lang="en-US" b="1" dirty="0"/>
+              <a:rPr lang="en-US" b="1" dirty="0">
+                <a:latin typeface="Source Sans Pro" panose="020B0503030403020204" pitchFamily="34" charset="0"/>
+                <a:ea typeface="Source Sans Pro" panose="020B0503030403020204" pitchFamily="34" charset="0"/>
+              </a:rPr>
               <a:t>Frequentist</a:t>
             </a:r>
           </a:p>
@@ -6122,8 +6200,8 @@
         </p:nvSpPr>
         <p:spPr>
           <a:xfrm>
-            <a:off x="8221332" y="2781090"/>
-            <a:ext cx="1030731" cy="369332"/>
+            <a:off x="8183501" y="2781090"/>
+            <a:ext cx="1106393" cy="369332"/>
           </a:xfrm>
           <a:prstGeom prst="rect">
             <a:avLst/>
@@ -6138,7 +6216,10 @@
           <a:p>
             <a:pPr algn="ctr"/>
             <a:r>
-              <a:rPr lang="en-US" b="1" dirty="0"/>
+              <a:rPr lang="en-US" b="1" dirty="0">
+                <a:latin typeface="Source Sans Pro" panose="020B0503030403020204" pitchFamily="34" charset="0"/>
+                <a:ea typeface="Source Sans Pro" panose="020B0503030403020204" pitchFamily="34" charset="0"/>
+              </a:rPr>
               <a:t>Bayesian</a:t>
             </a:r>
           </a:p>
@@ -6174,7 +6255,10 @@
           <a:p>
             <a:pPr algn="ctr"/>
             <a:r>
-              <a:rPr lang="en-US" dirty="0"/>
+              <a:rPr lang="en-US" dirty="0">
+                <a:latin typeface="Source Sans Pro" panose="020B0503030403020204" pitchFamily="34" charset="0"/>
+                <a:ea typeface="Source Sans Pro" panose="020B0503030403020204" pitchFamily="34" charset="0"/>
+              </a:rPr>
               <a:t>posterior distribution with credible interval</a:t>
             </a:r>
           </a:p>
@@ -6210,14 +6294,23 @@
           <a:p>
             <a:pPr algn="ctr"/>
             <a:r>
-              <a:rPr lang="en-US" i="1" dirty="0"/>
+              <a:rPr lang="en-US" i="1" dirty="0">
+                <a:latin typeface="Source Sans Pro" panose="020B0503030403020204" pitchFamily="34" charset="0"/>
+                <a:ea typeface="Source Sans Pro" panose="020B0503030403020204" pitchFamily="34" charset="0"/>
+              </a:rPr>
               <a:t>p </a:t>
             </a:r>
             <a:r>
-              <a:rPr lang="en-US" dirty="0"/>
+              <a:rPr lang="en-US" dirty="0">
+                <a:latin typeface="Source Sans Pro" panose="020B0503030403020204" pitchFamily="34" charset="0"/>
+                <a:ea typeface="Source Sans Pro" panose="020B0503030403020204" pitchFamily="34" charset="0"/>
+              </a:rPr>
               <a:t>value from null hypothesis significance test</a:t>
             </a:r>
-            <a:endParaRPr lang="en-US" i="1" dirty="0"/>
+            <a:endParaRPr lang="en-US" i="1" dirty="0">
+              <a:latin typeface="Source Sans Pro" panose="020B0503030403020204" pitchFamily="34" charset="0"/>
+              <a:ea typeface="Source Sans Pro" panose="020B0503030403020204" pitchFamily="34" charset="0"/>
+            </a:endParaRPr>
           </a:p>
         </p:txBody>
       </p:sp>
@@ -6251,7 +6344,10 @@
           <a:p>
             <a:pPr algn="ctr"/>
             <a:r>
-              <a:rPr lang="en-US" b="1" dirty="0"/>
+              <a:rPr lang="en-US" b="1" dirty="0">
+                <a:latin typeface="Source Sans Pro" panose="020B0503030403020204" pitchFamily="34" charset="0"/>
+                <a:ea typeface="Source Sans Pro" panose="020B0503030403020204" pitchFamily="34" charset="0"/>
+              </a:rPr>
               <a:t>Hypothesis focused</a:t>
             </a:r>
           </a:p>
@@ -6271,8 +6367,8 @@
         </p:nvSpPr>
         <p:spPr>
           <a:xfrm>
-            <a:off x="3740639" y="3539589"/>
-            <a:ext cx="1543558" cy="646331"/>
+            <a:off x="3677478" y="3539589"/>
+            <a:ext cx="1606719" cy="646331"/>
           </a:xfrm>
           <a:prstGeom prst="rect">
             <a:avLst/>
@@ -6287,7 +6383,10 @@
           <a:p>
             <a:pPr algn="ctr"/>
             <a:r>
-              <a:rPr lang="en-US" b="1" dirty="0"/>
+              <a:rPr lang="en-US" b="1" dirty="0">
+                <a:latin typeface="Source Sans Pro" panose="020B0503030403020204" pitchFamily="34" charset="0"/>
+                <a:ea typeface="Source Sans Pro" panose="020B0503030403020204" pitchFamily="34" charset="0"/>
+              </a:rPr>
               <a:t>Measurement focused</a:t>
             </a:r>
           </a:p>
@@ -6308,7 +6407,7 @@
         <p:spPr>
           <a:xfrm>
             <a:off x="8108316" y="4722981"/>
-            <a:ext cx="1326582" cy="369332"/>
+            <a:ext cx="1375698" cy="369332"/>
           </a:xfrm>
           <a:prstGeom prst="rect">
             <a:avLst/>
@@ -6322,7 +6421,10 @@
           <a:lstStyle/>
           <a:p>
             <a:r>
-              <a:rPr lang="en-US" dirty="0"/>
+              <a:rPr lang="en-US" dirty="0">
+                <a:latin typeface="Source Sans Pro" panose="020B0503030403020204" pitchFamily="34" charset="0"/>
+                <a:ea typeface="Source Sans Pro" panose="020B0503030403020204" pitchFamily="34" charset="0"/>
+              </a:rPr>
               <a:t>Bayes factor</a:t>
             </a:r>
           </a:p>
@@ -6358,7 +6460,10 @@
           <a:p>
             <a:pPr algn="ctr"/>
             <a:r>
-              <a:rPr lang="en-US" dirty="0"/>
+              <a:rPr lang="en-US" dirty="0">
+                <a:latin typeface="Source Sans Pro" panose="020B0503030403020204" pitchFamily="34" charset="0"/>
+                <a:ea typeface="Source Sans Pro" panose="020B0503030403020204" pitchFamily="34" charset="0"/>
+              </a:rPr>
               <a:t>estimate with confidence interval</a:t>
             </a:r>
           </a:p>

</xml_diff>

<commit_message>
image fixes for ch 10
</commit_message>
<xml_diff>
--- a/images/inference/src/power-diagram.pptx
+++ b/images/inference/src/power-diagram.pptx
@@ -189,7 +189,7 @@
     <inkml:brush xml:id="br0">
       <inkml:brushProperty name="width" value="0.1" units="cm"/>
       <inkml:brushProperty name="height" value="0.1" units="cm"/>
-      <inkml:brushProperty name="color" value="#E71224"/>
+      <inkml:brushProperty name="color" value="#C93431"/>
     </inkml:brush>
   </inkml:definitions>
   <inkml:trace contextRef="#ctx0" brushRef="#br0">0 1519 24575,'0'-24'0,"5"0"0,-4 4 0,8 1 0,-8-1 0,3 0 0,-4 0 0,4 5 0,-3 1 0,3-6 0,-4 5 0,0-16 0,0 5 0,14-22 0,-5 5 0,15-1 0,-11 6 0,7 4 0,-8 0 0,10-5 0,-10 12 0,3-5 0,-4 5 0,4 0 0,-3-4 0,2 4 0,1 0 0,-3-4 0,3 4 0,0 0 0,-3-4 0,7 9 0,-7-9 0,2 10 0,1-5 0,-4 1 0,9-2 0,-8 0 0,8-5 0,-2-1 0,10-3 0,-4-4 0,10 5 0,-11 2 0,5-1 0,-6 1 0,-1 6 0,0 2 0,-6 5 0,-1 5 0,-4 1 0,-5 5 0,3 4 0,-7-3 0,-1 7 0,-5-3 0,-3 4 0,-6 5 0,4 0 0,-8 0 0,7 3 0,-13-2 0,7 3 0,-8 2 0,-1-6 0,-1 5 0,-5-4 0,5 4 0,1 1 0,0-6 0,5 4 0,0-8 0,7 7 0,5-7 0,0 3 0,1-4 0,3 4 0,21-11 0,-2 4 0,17-10 0,-11-2 0,5 4 0,-3-4 0,3 1 0,1 2 0,1-8 0,0 9 0,4-10 0,-9 10 0,3-4 0,-10 5 0,-1 5 0,-5-3 0,0 7 0,0-3 0,-4 7 0,-1 2 0,5 4 0,-3 0 0,13 6 0,-9 0 0,10 10 0,-5-3 0,7 9 0,-6-4 0,6 12 0,-10-5 0,4 0 0,-5-3 0,-1-9 0,0-2 0,-5-6 0,-1-5 0,-4 0 0,0 0 0,4 0 0,-3-1 0,3-3 0,-4-1 0</inkml:trace>
@@ -694,7 +694,7 @@
           <a:p>
             <a:fld id="{5303E370-D265-2C46-8068-DCA558B4929C}" type="datetimeFigureOut">
               <a:rPr lang="en-US" smtClean="0"/>
-              <a:t>12/19/23</a:t>
+              <a:t>12/20/23</a:t>
             </a:fld>
             <a:endParaRPr lang="en-US"/>
           </a:p>
@@ -892,7 +892,7 @@
           <a:p>
             <a:fld id="{5303E370-D265-2C46-8068-DCA558B4929C}" type="datetimeFigureOut">
               <a:rPr lang="en-US" smtClean="0"/>
-              <a:t>12/19/23</a:t>
+              <a:t>12/20/23</a:t>
             </a:fld>
             <a:endParaRPr lang="en-US"/>
           </a:p>
@@ -1100,7 +1100,7 @@
           <a:p>
             <a:fld id="{5303E370-D265-2C46-8068-DCA558B4929C}" type="datetimeFigureOut">
               <a:rPr lang="en-US" smtClean="0"/>
-              <a:t>12/19/23</a:t>
+              <a:t>12/20/23</a:t>
             </a:fld>
             <a:endParaRPr lang="en-US"/>
           </a:p>
@@ -1298,7 +1298,7 @@
           <a:p>
             <a:fld id="{5303E370-D265-2C46-8068-DCA558B4929C}" type="datetimeFigureOut">
               <a:rPr lang="en-US" smtClean="0"/>
-              <a:t>12/19/23</a:t>
+              <a:t>12/20/23</a:t>
             </a:fld>
             <a:endParaRPr lang="en-US"/>
           </a:p>
@@ -1573,7 +1573,7 @@
           <a:p>
             <a:fld id="{5303E370-D265-2C46-8068-DCA558B4929C}" type="datetimeFigureOut">
               <a:rPr lang="en-US" smtClean="0"/>
-              <a:t>12/19/23</a:t>
+              <a:t>12/20/23</a:t>
             </a:fld>
             <a:endParaRPr lang="en-US"/>
           </a:p>
@@ -1838,7 +1838,7 @@
           <a:p>
             <a:fld id="{5303E370-D265-2C46-8068-DCA558B4929C}" type="datetimeFigureOut">
               <a:rPr lang="en-US" smtClean="0"/>
-              <a:t>12/19/23</a:t>
+              <a:t>12/20/23</a:t>
             </a:fld>
             <a:endParaRPr lang="en-US"/>
           </a:p>
@@ -2250,7 +2250,7 @@
           <a:p>
             <a:fld id="{5303E370-D265-2C46-8068-DCA558B4929C}" type="datetimeFigureOut">
               <a:rPr lang="en-US" smtClean="0"/>
-              <a:t>12/19/23</a:t>
+              <a:t>12/20/23</a:t>
             </a:fld>
             <a:endParaRPr lang="en-US"/>
           </a:p>
@@ -2391,7 +2391,7 @@
           <a:p>
             <a:fld id="{5303E370-D265-2C46-8068-DCA558B4929C}" type="datetimeFigureOut">
               <a:rPr lang="en-US" smtClean="0"/>
-              <a:t>12/19/23</a:t>
+              <a:t>12/20/23</a:t>
             </a:fld>
             <a:endParaRPr lang="en-US"/>
           </a:p>
@@ -2504,7 +2504,7 @@
           <a:p>
             <a:fld id="{5303E370-D265-2C46-8068-DCA558B4929C}" type="datetimeFigureOut">
               <a:rPr lang="en-US" smtClean="0"/>
-              <a:t>12/19/23</a:t>
+              <a:t>12/20/23</a:t>
             </a:fld>
             <a:endParaRPr lang="en-US"/>
           </a:p>
@@ -2815,7 +2815,7 @@
           <a:p>
             <a:fld id="{5303E370-D265-2C46-8068-DCA558B4929C}" type="datetimeFigureOut">
               <a:rPr lang="en-US" smtClean="0"/>
-              <a:t>12/19/23</a:t>
+              <a:t>12/20/23</a:t>
             </a:fld>
             <a:endParaRPr lang="en-US"/>
           </a:p>
@@ -3103,7 +3103,7 @@
           <a:p>
             <a:fld id="{5303E370-D265-2C46-8068-DCA558B4929C}" type="datetimeFigureOut">
               <a:rPr lang="en-US" smtClean="0"/>
-              <a:t>12/19/23</a:t>
+              <a:t>12/20/23</a:t>
             </a:fld>
             <a:endParaRPr lang="en-US"/>
           </a:p>
@@ -3344,7 +3344,7 @@
           <a:p>
             <a:fld id="{5303E370-D265-2C46-8068-DCA558B4929C}" type="datetimeFigureOut">
               <a:rPr lang="en-US" smtClean="0"/>
-              <a:t>12/19/23</a:t>
+              <a:t>12/20/23</a:t>
             </a:fld>
             <a:endParaRPr lang="en-US"/>
           </a:p>
@@ -4120,8 +4120,8 @@
           </a:p>
         </p:txBody>
       </p:sp>
-      <mc:AlternateContent xmlns:mc="http://schemas.openxmlformats.org/markup-compatibility/2006">
-        <mc:Choice xmlns:a14="http://schemas.microsoft.com/office/drawing/2010/main" Requires="a14">
+      <mc:AlternateContent xmlns:mc="http://schemas.openxmlformats.org/markup-compatibility/2006" xmlns:a14="http://schemas.microsoft.com/office/drawing/2010/main">
+        <mc:Choice Requires="a14">
           <p:sp>
             <p:nvSpPr>
               <p:cNvPr id="15" name="TextBox 14">
@@ -4190,7 +4190,7 @@
             </p:txBody>
           </p:sp>
         </mc:Choice>
-        <mc:Fallback>
+        <mc:Fallback xmlns="">
           <p:sp>
             <p:nvSpPr>
               <p:cNvPr id="15" name="TextBox 14">
@@ -4235,8 +4235,8 @@
           </p:sp>
         </mc:Fallback>
       </mc:AlternateContent>
-      <mc:AlternateContent xmlns:mc="http://schemas.openxmlformats.org/markup-compatibility/2006">
-        <mc:Choice xmlns:a14="http://schemas.microsoft.com/office/drawing/2010/main" Requires="a14">
+      <mc:AlternateContent xmlns:mc="http://schemas.openxmlformats.org/markup-compatibility/2006" xmlns:a14="http://schemas.microsoft.com/office/drawing/2010/main">
+        <mc:Choice Requires="a14">
           <p:sp>
             <p:nvSpPr>
               <p:cNvPr id="16" name="TextBox 15">
@@ -4300,7 +4300,7 @@
             </p:txBody>
           </p:sp>
         </mc:Choice>
-        <mc:Fallback>
+        <mc:Fallback xmlns="">
           <p:sp>
             <p:nvSpPr>
               <p:cNvPr id="16" name="TextBox 15">
@@ -4537,8 +4537,8 @@
           </a:p>
         </p:txBody>
       </p:sp>
-      <mc:AlternateContent xmlns:mc="http://schemas.openxmlformats.org/markup-compatibility/2006">
-        <mc:Choice xmlns:a14="http://schemas.microsoft.com/office/drawing/2010/main" Requires="a14">
+      <mc:AlternateContent xmlns:mc="http://schemas.openxmlformats.org/markup-compatibility/2006" xmlns:a14="http://schemas.microsoft.com/office/drawing/2010/main">
+        <mc:Choice Requires="a14">
           <p:sp>
             <p:nvSpPr>
               <p:cNvPr id="22" name="TextBox 21">
@@ -4614,7 +4614,7 @@
             </p:txBody>
           </p:sp>
         </mc:Choice>
-        <mc:Fallback>
+        <mc:Fallback xmlns="">
           <p:sp>
             <p:nvSpPr>
               <p:cNvPr id="22" name="TextBox 21">
@@ -4659,8 +4659,8 @@
           </p:sp>
         </mc:Fallback>
       </mc:AlternateContent>
-      <mc:AlternateContent xmlns:mc="http://schemas.openxmlformats.org/markup-compatibility/2006">
-        <mc:Choice xmlns:a14="http://schemas.microsoft.com/office/drawing/2010/main" Requires="a14">
+      <mc:AlternateContent xmlns:mc="http://schemas.openxmlformats.org/markup-compatibility/2006" xmlns:a14="http://schemas.microsoft.com/office/drawing/2010/main">
+        <mc:Choice Requires="a14">
           <p:sp>
             <p:nvSpPr>
               <p:cNvPr id="23" name="TextBox 22">
@@ -4730,7 +4730,7 @@
             </p:txBody>
           </p:sp>
         </mc:Choice>
-        <mc:Fallback>
+        <mc:Fallback xmlns="">
           <p:sp>
             <p:nvSpPr>
               <p:cNvPr id="23" name="TextBox 22">
@@ -4789,7 +4789,7 @@
 </file>
 
 <file path=ppt/slides/slide2.xml><?xml version="1.0" encoding="utf-8"?>
-<p:sld xmlns:a="http://schemas.openxmlformats.org/drawingml/2006/main" xmlns:r="http://schemas.openxmlformats.org/officeDocument/2006/relationships" xmlns:p="http://schemas.openxmlformats.org/presentationml/2006/main" show="0">
+<p:sld xmlns:a="http://schemas.openxmlformats.org/drawingml/2006/main" xmlns:r="http://schemas.openxmlformats.org/officeDocument/2006/relationships" xmlns:p="http://schemas.openxmlformats.org/presentationml/2006/main">
   <p:cSld>
     <p:spTree>
       <p:nvGrpSpPr>
@@ -5060,8 +5060,8 @@
           </p:pic>
         </mc:Fallback>
       </mc:AlternateContent>
-      <mc:AlternateContent xmlns:mc="http://schemas.openxmlformats.org/markup-compatibility/2006" xmlns:a14="http://schemas.microsoft.com/office/drawing/2010/main">
-        <mc:Choice Requires="a14">
+      <mc:AlternateContent xmlns:mc="http://schemas.openxmlformats.org/markup-compatibility/2006">
+        <mc:Choice xmlns:a14="http://schemas.microsoft.com/office/drawing/2010/main" Requires="a14">
           <p:sp>
             <p:nvSpPr>
               <p:cNvPr id="15" name="TextBox 14">
@@ -5077,7 +5077,7 @@
             <p:spPr>
               <a:xfrm>
                 <a:off x="6649630" y="3372793"/>
-                <a:ext cx="1503489" cy="923330"/>
+                <a:ext cx="1561646" cy="923330"/>
               </a:xfrm>
               <a:prstGeom prst="rect">
                 <a:avLst/>
@@ -5091,7 +5091,10 @@
               <a:lstStyle/>
               <a:p>
                 <a:r>
-                  <a:rPr lang="en-US" dirty="0"/>
+                  <a:rPr lang="en-US" dirty="0">
+                    <a:latin typeface="Source Sans Pro" panose="020B0503030403020204" pitchFamily="34" charset="0"/>
+                    <a:ea typeface="Source Sans Pro" panose="020B0503030403020204" pitchFamily="34" charset="0"/>
+                  </a:rPr>
                   <a:t>False negative</a:t>
                 </a:r>
               </a:p>
@@ -5113,15 +5116,21 @@
                     </m:oMath>
                   </m:oMathPara>
                 </a14:m>
-                <a:endParaRPr lang="en-US" dirty="0"/>
+                <a:endParaRPr lang="en-US" dirty="0">
+                  <a:latin typeface="Source Sans Pro" panose="020B0503030403020204" pitchFamily="34" charset="0"/>
+                  <a:ea typeface="Source Sans Pro" panose="020B0503030403020204" pitchFamily="34" charset="0"/>
+                </a:endParaRPr>
               </a:p>
               <a:p>
-                <a:endParaRPr lang="en-US" dirty="0"/>
+                <a:endParaRPr lang="en-US" dirty="0">
+                  <a:latin typeface="Source Sans Pro" panose="020B0503030403020204" pitchFamily="34" charset="0"/>
+                  <a:ea typeface="Source Sans Pro" panose="020B0503030403020204" pitchFamily="34" charset="0"/>
+                </a:endParaRPr>
               </a:p>
             </p:txBody>
           </p:sp>
         </mc:Choice>
-        <mc:Fallback xmlns="">
+        <mc:Fallback>
           <p:sp>
             <p:nvSpPr>
               <p:cNvPr id="15" name="TextBox 14">
@@ -5139,7 +5148,7 @@
             <p:spPr>
               <a:xfrm>
                 <a:off x="6649630" y="3372793"/>
-                <a:ext cx="1503489" cy="923330"/>
+                <a:ext cx="1561646" cy="923330"/>
               </a:xfrm>
               <a:prstGeom prst="rect">
                 <a:avLst/>
@@ -5147,7 +5156,7 @@
               <a:blipFill>
                 <a:blip r:embed="rId12"/>
                 <a:stretch>
-                  <a:fillRect l="-3361" t="-2703" r="-2521"/>
+                  <a:fillRect l="-3226" t="-2703" r="-2419"/>
                 </a:stretch>
               </a:blipFill>
             </p:spPr>
@@ -5166,8 +5175,8 @@
           </p:sp>
         </mc:Fallback>
       </mc:AlternateContent>
-      <mc:AlternateContent xmlns:mc="http://schemas.openxmlformats.org/markup-compatibility/2006" xmlns:a14="http://schemas.microsoft.com/office/drawing/2010/main">
-        <mc:Choice Requires="a14">
+      <mc:AlternateContent xmlns:mc="http://schemas.openxmlformats.org/markup-compatibility/2006">
+        <mc:Choice xmlns:a14="http://schemas.microsoft.com/office/drawing/2010/main" Requires="a14">
           <p:sp>
             <p:nvSpPr>
               <p:cNvPr id="16" name="TextBox 15">
@@ -5182,8 +5191,8 @@
             </p:nvSpPr>
             <p:spPr>
               <a:xfrm>
-                <a:off x="4312402" y="2348752"/>
-                <a:ext cx="1439368" cy="646331"/>
+                <a:off x="4285728" y="2348752"/>
+                <a:ext cx="1492716" cy="646331"/>
               </a:xfrm>
               <a:prstGeom prst="rect">
                 <a:avLst/>
@@ -5198,7 +5207,10 @@
               <a:p>
                 <a:pPr algn="ctr"/>
                 <a:r>
-                  <a:rPr lang="en-US" dirty="0"/>
+                  <a:rPr lang="en-US" dirty="0">
+                    <a:latin typeface="Source Sans Pro" panose="020B0503030403020204" pitchFamily="34" charset="0"/>
+                    <a:ea typeface="Source Sans Pro" panose="020B0503030403020204" pitchFamily="34" charset="0"/>
+                  </a:rPr>
                   <a:t>False positive</a:t>
                 </a:r>
               </a:p>
@@ -5220,12 +5232,15 @@
                     </m:oMath>
                   </m:oMathPara>
                 </a14:m>
-                <a:endParaRPr lang="en-US" dirty="0"/>
+                <a:endParaRPr lang="en-US" dirty="0">
+                  <a:latin typeface="Source Sans Pro" panose="020B0503030403020204" pitchFamily="34" charset="0"/>
+                  <a:ea typeface="Source Sans Pro" panose="020B0503030403020204" pitchFamily="34" charset="0"/>
+                </a:endParaRPr>
               </a:p>
             </p:txBody>
           </p:sp>
         </mc:Choice>
-        <mc:Fallback xmlns="">
+        <mc:Fallback>
           <p:sp>
             <p:nvSpPr>
               <p:cNvPr id="16" name="TextBox 15">
@@ -5242,8 +5257,8 @@
             </p:nvSpPr>
             <p:spPr>
               <a:xfrm>
-                <a:off x="4312402" y="2348752"/>
-                <a:ext cx="1439368" cy="646331"/>
+                <a:off x="4285728" y="2348752"/>
+                <a:ext cx="1492716" cy="646331"/>
               </a:xfrm>
               <a:prstGeom prst="rect">
                 <a:avLst/>
@@ -5251,7 +5266,7 @@
               <a:blipFill>
                 <a:blip r:embed="rId13"/>
                 <a:stretch>
-                  <a:fillRect l="-2609" t="-3846" r="-2609"/>
+                  <a:fillRect l="-2521" t="-3846" r="-2521"/>
                 </a:stretch>
               </a:blipFill>
             </p:spPr>
@@ -5285,7 +5300,7 @@
         <p:spPr>
           <a:xfrm>
             <a:off x="5505865" y="1032481"/>
-            <a:ext cx="1387624" cy="461665"/>
+            <a:ext cx="1476686" cy="461665"/>
           </a:xfrm>
           <a:prstGeom prst="rect">
             <a:avLst/>
@@ -5299,7 +5314,10 @@
           <a:lstStyle/>
           <a:p>
             <a:r>
-              <a:rPr lang="en-US" sz="2400" b="1" dirty="0"/>
+              <a:rPr lang="en-US" sz="2400" b="1" dirty="0">
+                <a:latin typeface="Source Sans Pro" panose="020B0503030403020204" pitchFamily="34" charset="0"/>
+                <a:ea typeface="Source Sans Pro" panose="020B0503030403020204" pitchFamily="34" charset="0"/>
+              </a:rPr>
               <a:t>Inference</a:t>
             </a:r>
           </a:p>
@@ -5319,8 +5337,8 @@
         </p:nvSpPr>
         <p:spPr>
           <a:xfrm rot="16200000">
-            <a:off x="2047218" y="2935318"/>
-            <a:ext cx="1065035" cy="461665"/>
+            <a:off x="2006502" y="2935318"/>
+            <a:ext cx="1146468" cy="461665"/>
           </a:xfrm>
           <a:prstGeom prst="rect">
             <a:avLst/>
@@ -5334,14 +5352,17 @@
           <a:lstStyle/>
           <a:p>
             <a:r>
-              <a:rPr lang="en-US" sz="2400" b="1" dirty="0"/>
+              <a:rPr lang="en-US" sz="2400" b="1" dirty="0">
+                <a:latin typeface="Source Sans Pro" panose="020B0503030403020204" pitchFamily="34" charset="0"/>
+                <a:ea typeface="Source Sans Pro" panose="020B0503030403020204" pitchFamily="34" charset="0"/>
+              </a:rPr>
               <a:t>Reality</a:t>
             </a:r>
           </a:p>
         </p:txBody>
       </p:sp>
-      <mc:AlternateContent xmlns:mc="http://schemas.openxmlformats.org/markup-compatibility/2006" xmlns:a14="http://schemas.microsoft.com/office/drawing/2010/main">
-        <mc:Choice Requires="a14">
+      <mc:AlternateContent xmlns:mc="http://schemas.openxmlformats.org/markup-compatibility/2006">
+        <mc:Choice xmlns:a14="http://schemas.microsoft.com/office/drawing/2010/main" Requires="a14">
           <p:sp>
             <p:nvSpPr>
               <p:cNvPr id="22" name="TextBox 21">
@@ -5357,7 +5378,7 @@
             <p:spPr>
               <a:xfrm>
                 <a:off x="4403395" y="3372793"/>
-                <a:ext cx="1439305" cy="923330"/>
+                <a:ext cx="1481496" cy="923330"/>
               </a:xfrm>
               <a:prstGeom prst="rect">
                 <a:avLst/>
@@ -5371,7 +5392,10 @@
               <a:lstStyle/>
               <a:p>
                 <a:r>
-                  <a:rPr lang="en-US" dirty="0"/>
+                  <a:rPr lang="en-US" dirty="0">
+                    <a:latin typeface="Source Sans Pro" panose="020B0503030403020204" pitchFamily="34" charset="0"/>
+                    <a:ea typeface="Source Sans Pro" panose="020B0503030403020204" pitchFamily="34" charset="0"/>
+                  </a:rPr>
                   <a:t>True positive </a:t>
                 </a:r>
               </a:p>
@@ -5400,15 +5424,21 @@
                     </m:oMath>
                   </m:oMathPara>
                 </a14:m>
-                <a:endParaRPr lang="en-US" dirty="0"/>
+                <a:endParaRPr lang="en-US" dirty="0">
+                  <a:latin typeface="Source Sans Pro" panose="020B0503030403020204" pitchFamily="34" charset="0"/>
+                  <a:ea typeface="Source Sans Pro" panose="020B0503030403020204" pitchFamily="34" charset="0"/>
+                </a:endParaRPr>
               </a:p>
               <a:p>
-                <a:endParaRPr lang="en-US" dirty="0"/>
+                <a:endParaRPr lang="en-US" dirty="0">
+                  <a:latin typeface="Source Sans Pro" panose="020B0503030403020204" pitchFamily="34" charset="0"/>
+                  <a:ea typeface="Source Sans Pro" panose="020B0503030403020204" pitchFamily="34" charset="0"/>
+                </a:endParaRPr>
               </a:p>
             </p:txBody>
           </p:sp>
         </mc:Choice>
-        <mc:Fallback xmlns="">
+        <mc:Fallback>
           <p:sp>
             <p:nvSpPr>
               <p:cNvPr id="22" name="TextBox 21">
@@ -5426,7 +5456,7 @@
             <p:spPr>
               <a:xfrm>
                 <a:off x="4403395" y="3372793"/>
-                <a:ext cx="1439305" cy="923330"/>
+                <a:ext cx="1481496" cy="923330"/>
               </a:xfrm>
               <a:prstGeom prst="rect">
                 <a:avLst/>
@@ -5434,7 +5464,7 @@
               <a:blipFill>
                 <a:blip r:embed="rId14"/>
                 <a:stretch>
-                  <a:fillRect l="-3509" t="-2703" r="-3509"/>
+                  <a:fillRect l="-3390" t="-2703" r="-2542"/>
                 </a:stretch>
               </a:blipFill>
             </p:spPr>
@@ -5453,8 +5483,8 @@
           </p:sp>
         </mc:Fallback>
       </mc:AlternateContent>
-      <mc:AlternateContent xmlns:mc="http://schemas.openxmlformats.org/markup-compatibility/2006" xmlns:a14="http://schemas.microsoft.com/office/drawing/2010/main">
-        <mc:Choice Requires="a14">
+      <mc:AlternateContent xmlns:mc="http://schemas.openxmlformats.org/markup-compatibility/2006">
+        <mc:Choice xmlns:a14="http://schemas.microsoft.com/office/drawing/2010/main" Requires="a14">
           <p:sp>
             <p:nvSpPr>
               <p:cNvPr id="23" name="TextBox 22">
@@ -5470,7 +5500,7 @@
             <p:spPr>
               <a:xfrm>
                 <a:off x="6389110" y="2301073"/>
-                <a:ext cx="1764009" cy="646331"/>
+                <a:ext cx="1803699" cy="646331"/>
               </a:xfrm>
               <a:prstGeom prst="rect">
                 <a:avLst/>
@@ -5484,7 +5514,10 @@
               <a:lstStyle/>
               <a:p>
                 <a:r>
-                  <a:rPr lang="en-US" dirty="0"/>
+                  <a:rPr lang="en-US" dirty="0">
+                    <a:latin typeface="Source Sans Pro" panose="020B0503030403020204" pitchFamily="34" charset="0"/>
+                    <a:ea typeface="Source Sans Pro" panose="020B0503030403020204" pitchFamily="34" charset="0"/>
+                  </a:rPr>
                   <a:t>Correct rejection</a:t>
                 </a:r>
               </a:p>
@@ -5513,12 +5546,15 @@
                     </m:oMath>
                   </m:oMathPara>
                 </a14:m>
-                <a:endParaRPr lang="en-US" dirty="0"/>
+                <a:endParaRPr lang="en-US" dirty="0">
+                  <a:latin typeface="Source Sans Pro" panose="020B0503030403020204" pitchFamily="34" charset="0"/>
+                  <a:ea typeface="Source Sans Pro" panose="020B0503030403020204" pitchFamily="34" charset="0"/>
+                </a:endParaRPr>
               </a:p>
             </p:txBody>
           </p:sp>
         </mc:Choice>
-        <mc:Fallback xmlns="">
+        <mc:Fallback>
           <p:sp>
             <p:nvSpPr>
               <p:cNvPr id="23" name="TextBox 22">
@@ -5536,7 +5572,7 @@
             <p:spPr>
               <a:xfrm>
                 <a:off x="6389110" y="2301073"/>
-                <a:ext cx="1764009" cy="646331"/>
+                <a:ext cx="1803699" cy="646331"/>
               </a:xfrm>
               <a:prstGeom prst="rect">
                 <a:avLst/>
@@ -5544,7 +5580,7 @@
               <a:blipFill>
                 <a:blip r:embed="rId15"/>
                 <a:stretch>
-                  <a:fillRect l="-2878" t="-1923" r="-2158"/>
+                  <a:fillRect l="-2797" t="-1923" r="-1399"/>
                 </a:stretch>
               </a:blipFill>
             </p:spPr>
@@ -5563,8 +5599,8 @@
           </p:sp>
         </mc:Fallback>
       </mc:AlternateContent>
-      <mc:AlternateContent xmlns:mc="http://schemas.openxmlformats.org/markup-compatibility/2006" xmlns:p14="http://schemas.microsoft.com/office/powerpoint/2010/main">
-        <mc:Choice Requires="p14">
+      <mc:AlternateContent xmlns:mc="http://schemas.openxmlformats.org/markup-compatibility/2006">
+        <mc:Choice xmlns:p14="http://schemas.microsoft.com/office/powerpoint/2010/main" Requires="p14">
           <p:contentPart p14:bwMode="auto" r:id="rId16">
             <p14:nvContentPartPr>
               <p14:cNvPr id="2" name="Ink 1">
@@ -5583,7 +5619,7 @@
             </p14:xfrm>
           </p:contentPart>
         </mc:Choice>
-        <mc:Fallback xmlns="">
+        <mc:Fallback>
           <p:pic>
             <p:nvPicPr>
               <p:cNvPr id="2" name="Ink 1">
@@ -5604,8 +5640,8 @@
             </p:blipFill>
             <p:spPr>
               <a:xfrm>
-                <a:off x="4334375" y="3984352"/>
-                <a:ext cx="357840" cy="582480"/>
+                <a:off x="4334395" y="3983992"/>
+                <a:ext cx="357800" cy="582480"/>
               </a:xfrm>
               <a:prstGeom prst="rect">
                 <a:avLst/>
@@ -5629,7 +5665,7 @@
         <p:spPr>
           <a:xfrm>
             <a:off x="2865153" y="4687673"/>
-            <a:ext cx="2818400" cy="430887"/>
+            <a:ext cx="2996333" cy="430887"/>
           </a:xfrm>
           <a:prstGeom prst="rect">
             <a:avLst/>
@@ -5644,7 +5680,8 @@
           <a:p>
             <a:r>
               <a:rPr lang="en-US" sz="2200" dirty="0">
-                <a:latin typeface="Times" pitchFamily="2" charset="0"/>
+                <a:latin typeface="ETbb" panose="02000503000000000000" pitchFamily="2" charset="0"/>
+                <a:ea typeface="Source Sans Pro" panose="020B0503030403020204" pitchFamily="34" charset="0"/>
               </a:rPr>
               <a:t>Power to reject the null</a:t>
             </a:r>
@@ -5666,7 +5703,7 @@
         <p:spPr>
           <a:xfrm>
             <a:off x="4251680" y="1586306"/>
-            <a:ext cx="1584857" cy="369332"/>
+            <a:ext cx="1617751" cy="369332"/>
           </a:xfrm>
           <a:prstGeom prst="rect">
             <a:avLst/>
@@ -5680,15 +5717,24 @@
           <a:lstStyle/>
           <a:p>
             <a:r>
-              <a:rPr lang="en-US" dirty="0"/>
+              <a:rPr lang="en-US" dirty="0">
+                <a:latin typeface="Source Sans Pro" panose="020B0503030403020204" pitchFamily="34" charset="0"/>
+                <a:ea typeface="Source Sans Pro" panose="020B0503030403020204" pitchFamily="34" charset="0"/>
+              </a:rPr>
               <a:t>Reject null (H</a:t>
             </a:r>
             <a:r>
-              <a:rPr lang="en-US" baseline="-25000" dirty="0"/>
+              <a:rPr lang="en-US" baseline="-25000" dirty="0">
+                <a:latin typeface="Source Sans Pro" panose="020B0503030403020204" pitchFamily="34" charset="0"/>
+                <a:ea typeface="Source Sans Pro" panose="020B0503030403020204" pitchFamily="34" charset="0"/>
+              </a:rPr>
               <a:t>0</a:t>
             </a:r>
             <a:r>
-              <a:rPr lang="en-US" dirty="0"/>
+              <a:rPr lang="en-US" dirty="0">
+                <a:latin typeface="Source Sans Pro" panose="020B0503030403020204" pitchFamily="34" charset="0"/>
+                <a:ea typeface="Source Sans Pro" panose="020B0503030403020204" pitchFamily="34" charset="0"/>
+              </a:rPr>
               <a:t>)</a:t>
             </a:r>
           </a:p>
@@ -5709,7 +5755,7 @@
         <p:spPr>
           <a:xfrm>
             <a:off x="6300595" y="1586306"/>
-            <a:ext cx="2159309" cy="369332"/>
+            <a:ext cx="2209259" cy="369332"/>
           </a:xfrm>
           <a:prstGeom prst="rect">
             <a:avLst/>
@@ -5723,15 +5769,24 @@
           <a:lstStyle/>
           <a:p>
             <a:r>
-              <a:rPr lang="en-US" dirty="0"/>
+              <a:rPr lang="en-US" dirty="0">
+                <a:latin typeface="Source Sans Pro" panose="020B0503030403020204" pitchFamily="34" charset="0"/>
+                <a:ea typeface="Source Sans Pro" panose="020B0503030403020204" pitchFamily="34" charset="0"/>
+              </a:rPr>
               <a:t>Fail to reject null (H</a:t>
             </a:r>
             <a:r>
-              <a:rPr lang="en-US" baseline="-25000" dirty="0"/>
+              <a:rPr lang="en-US" baseline="-25000" dirty="0">
+                <a:latin typeface="Source Sans Pro" panose="020B0503030403020204" pitchFamily="34" charset="0"/>
+                <a:ea typeface="Source Sans Pro" panose="020B0503030403020204" pitchFamily="34" charset="0"/>
+              </a:rPr>
               <a:t>0</a:t>
             </a:r>
             <a:r>
-              <a:rPr lang="en-US" dirty="0"/>
+              <a:rPr lang="en-US" dirty="0">
+                <a:latin typeface="Source Sans Pro" panose="020B0503030403020204" pitchFamily="34" charset="0"/>
+                <a:ea typeface="Source Sans Pro" panose="020B0503030403020204" pitchFamily="34" charset="0"/>
+              </a:rPr>
               <a:t>)</a:t>
             </a:r>
           </a:p>
@@ -5767,22 +5822,34 @@
           <a:p>
             <a:pPr algn="r"/>
             <a:r>
-              <a:rPr lang="en-US" dirty="0"/>
+              <a:rPr lang="en-US" dirty="0">
+                <a:latin typeface="Source Sans Pro" panose="020B0503030403020204" pitchFamily="34" charset="0"/>
+                <a:ea typeface="Source Sans Pro" panose="020B0503030403020204" pitchFamily="34" charset="0"/>
+              </a:rPr>
               <a:t>Null (H</a:t>
             </a:r>
             <a:r>
-              <a:rPr lang="en-US" baseline="-25000" dirty="0"/>
+              <a:rPr lang="en-US" baseline="-25000" dirty="0">
+                <a:latin typeface="Source Sans Pro" panose="020B0503030403020204" pitchFamily="34" charset="0"/>
+                <a:ea typeface="Source Sans Pro" panose="020B0503030403020204" pitchFamily="34" charset="0"/>
+              </a:rPr>
               <a:t>0</a:t>
             </a:r>
             <a:r>
-              <a:rPr lang="en-US" dirty="0"/>
+              <a:rPr lang="en-US" dirty="0">
+                <a:latin typeface="Source Sans Pro" panose="020B0503030403020204" pitchFamily="34" charset="0"/>
+                <a:ea typeface="Source Sans Pro" panose="020B0503030403020204" pitchFamily="34" charset="0"/>
+              </a:rPr>
               <a:t>)</a:t>
             </a:r>
           </a:p>
           <a:p>
             <a:pPr algn="r"/>
             <a:r>
-              <a:rPr lang="en-US" dirty="0"/>
+              <a:rPr lang="en-US" dirty="0">
+                <a:latin typeface="Source Sans Pro" panose="020B0503030403020204" pitchFamily="34" charset="0"/>
+                <a:ea typeface="Source Sans Pro" panose="020B0503030403020204" pitchFamily="34" charset="0"/>
+              </a:rPr>
               <a:t> is true</a:t>
             </a:r>
           </a:p>
@@ -5818,15 +5885,24 @@
           <a:p>
             <a:pPr algn="r"/>
             <a:r>
-              <a:rPr lang="en-US" dirty="0"/>
+              <a:rPr lang="en-US" dirty="0">
+                <a:latin typeface="Source Sans Pro" panose="020B0503030403020204" pitchFamily="34" charset="0"/>
+                <a:ea typeface="Source Sans Pro" panose="020B0503030403020204" pitchFamily="34" charset="0"/>
+              </a:rPr>
               <a:t>Null (H</a:t>
             </a:r>
             <a:r>
-              <a:rPr lang="en-US" baseline="-25000" dirty="0"/>
+              <a:rPr lang="en-US" baseline="-25000" dirty="0">
+                <a:latin typeface="Source Sans Pro" panose="020B0503030403020204" pitchFamily="34" charset="0"/>
+                <a:ea typeface="Source Sans Pro" panose="020B0503030403020204" pitchFamily="34" charset="0"/>
+              </a:rPr>
               <a:t>0</a:t>
             </a:r>
             <a:r>
-              <a:rPr lang="en-US" dirty="0"/>
+              <a:rPr lang="en-US" dirty="0">
+                <a:latin typeface="Source Sans Pro" panose="020B0503030403020204" pitchFamily="34" charset="0"/>
+                <a:ea typeface="Source Sans Pro" panose="020B0503030403020204" pitchFamily="34" charset="0"/>
+              </a:rPr>
               <a:t>) is false</a:t>
             </a:r>
           </a:p>

</xml_diff>